<commit_message>
documentdb demo working with query and filter query
</commit_message>
<xml_diff>
--- a/docs/20140917-AzureSearch-DocumentDB.pptx
+++ b/docs/20140917-AzureSearch-DocumentDB.pptx
@@ -5,7 +5,7 @@
     <p:sldMasterId id="2147483648" r:id="rId1"/>
   </p:sldMasterIdLst>
   <p:notesMasterIdLst>
-    <p:notesMasterId r:id="rId12"/>
+    <p:notesMasterId r:id="rId14"/>
   </p:notesMasterIdLst>
   <p:sldIdLst>
     <p:sldId id="256" r:id="rId2"/>
@@ -17,7 +17,9 @@
     <p:sldId id="262" r:id="rId8"/>
     <p:sldId id="264" r:id="rId9"/>
     <p:sldId id="265" r:id="rId10"/>
-    <p:sldId id="263" r:id="rId11"/>
+    <p:sldId id="266" r:id="rId11"/>
+    <p:sldId id="267" r:id="rId12"/>
+    <p:sldId id="263" r:id="rId13"/>
   </p:sldIdLst>
   <p:sldSz cx="12192000" cy="6858000"/>
   <p:notesSz cx="6858000" cy="9144000"/>
@@ -799,12 +801,12 @@
               <a:defRPr/>
             </a:pPr>
             <a:r>
-              <a:rPr lang="en-US" smtClean="0"/>
+              <a:rPr lang="en-US" dirty="0" smtClean="0"/>
               <a:t>http://azure.microsoft.com/en-us/documentation/articles/documentdb-interactions-with-resources/</a:t>
             </a:r>
           </a:p>
           <a:p>
-            <a:endParaRPr lang="en-US"/>
+            <a:endParaRPr lang="en-US" dirty="0"/>
           </a:p>
         </p:txBody>
       </p:sp>
@@ -4047,6 +4049,388 @@
 </file>
 
 <file path=ppt/slides/slide10.xml><?xml version="1.0" encoding="utf-8"?>
+<p:sld xmlns:a="http://schemas.openxmlformats.org/drawingml/2006/main" xmlns:r="http://schemas.openxmlformats.org/officeDocument/2006/relationships" xmlns:p="http://schemas.openxmlformats.org/presentationml/2006/main">
+  <p:cSld>
+    <p:spTree>
+      <p:nvGrpSpPr>
+        <p:cNvPr id="1" name=""/>
+        <p:cNvGrpSpPr/>
+        <p:nvPr/>
+      </p:nvGrpSpPr>
+      <p:grpSpPr>
+        <a:xfrm>
+          <a:off x="0" y="0"/>
+          <a:ext cx="0" cy="0"/>
+          <a:chOff x="0" y="0"/>
+          <a:chExt cx="0" cy="0"/>
+        </a:xfrm>
+      </p:grpSpPr>
+      <p:sp>
+        <p:nvSpPr>
+          <p:cNvPr id="2" name="Title 1"/>
+          <p:cNvSpPr>
+            <a:spLocks noGrp="1"/>
+          </p:cNvSpPr>
+          <p:nvPr>
+            <p:ph type="title"/>
+          </p:nvPr>
+        </p:nvSpPr>
+        <p:spPr/>
+        <p:txBody>
+          <a:bodyPr/>
+          <a:lstStyle/>
+          <a:p>
+            <a:r>
+              <a:rPr lang="en-US" dirty="0" smtClean="0"/>
+              <a:t>Querying</a:t>
+            </a:r>
+            <a:endParaRPr lang="en-US" dirty="0"/>
+          </a:p>
+        </p:txBody>
+      </p:sp>
+      <p:pic>
+        <p:nvPicPr>
+          <p:cNvPr id="4" name="Picture 3"/>
+          <p:cNvPicPr>
+            <a:picLocks noChangeAspect="1"/>
+          </p:cNvPicPr>
+          <p:nvPr/>
+        </p:nvPicPr>
+        <p:blipFill>
+          <a:blip r:embed="rId2"/>
+          <a:stretch>
+            <a:fillRect/>
+          </a:stretch>
+        </p:blipFill>
+        <p:spPr>
+          <a:xfrm>
+            <a:off x="3855761" y="483290"/>
+            <a:ext cx="6448425" cy="5772150"/>
+          </a:xfrm>
+          <a:prstGeom prst="rect">
+            <a:avLst/>
+          </a:prstGeom>
+        </p:spPr>
+      </p:pic>
+      <p:sp>
+        <p:nvSpPr>
+          <p:cNvPr id="5" name="TextBox 4"/>
+          <p:cNvSpPr txBox="1"/>
+          <p:nvPr/>
+        </p:nvSpPr>
+        <p:spPr>
+          <a:xfrm>
+            <a:off x="576470" y="2325756"/>
+            <a:ext cx="3150704" cy="1477328"/>
+          </a:xfrm>
+          <a:prstGeom prst="rect">
+            <a:avLst/>
+          </a:prstGeom>
+          <a:noFill/>
+        </p:spPr>
+        <p:txBody>
+          <a:bodyPr wrap="square" rtlCol="0">
+            <a:spAutoFit/>
+          </a:bodyPr>
+          <a:lstStyle/>
+          <a:p>
+            <a:r>
+              <a:rPr lang="en-US" dirty="0"/>
+              <a:t>string </a:t>
+            </a:r>
+            <a:r>
+              <a:rPr lang="en-US" dirty="0" err="1"/>
+              <a:t>sql</a:t>
+            </a:r>
+            <a:r>
+              <a:rPr lang="en-US" dirty="0"/>
+              <a:t> = </a:t>
+            </a:r>
+            <a:r>
+              <a:rPr lang="en-US" dirty="0" err="1"/>
+              <a:t>String.Format</a:t>
+            </a:r>
+            <a:r>
+              <a:rPr lang="en-US" dirty="0"/>
+              <a:t>("SELECT * FROM {0} l WHERE </a:t>
+            </a:r>
+            <a:r>
+              <a:rPr lang="en-US" dirty="0" err="1"/>
+              <a:t>l.Package</a:t>
+            </a:r>
+            <a:r>
+              <a:rPr lang="en-US" dirty="0"/>
+              <a:t> = '</a:t>
+            </a:r>
+            <a:r>
+              <a:rPr lang="en-US" dirty="0" err="1"/>
+              <a:t>rubicon</a:t>
+            </a:r>
+            <a:r>
+              <a:rPr lang="en-US" dirty="0"/>
+              <a:t>'", </a:t>
+            </a:r>
+            <a:r>
+              <a:rPr lang="en-US" dirty="0" err="1"/>
+              <a:t>Keys.ListingCollectionName</a:t>
+            </a:r>
+            <a:r>
+              <a:rPr lang="en-US" dirty="0"/>
+              <a:t>);</a:t>
+            </a:r>
+          </a:p>
+        </p:txBody>
+      </p:sp>
+      <p:sp>
+        <p:nvSpPr>
+          <p:cNvPr id="6" name="TextBox 5"/>
+          <p:cNvSpPr txBox="1"/>
+          <p:nvPr/>
+        </p:nvSpPr>
+        <p:spPr>
+          <a:xfrm>
+            <a:off x="440635" y="6255440"/>
+            <a:ext cx="7965835" cy="369332"/>
+          </a:xfrm>
+          <a:prstGeom prst="rect">
+            <a:avLst/>
+          </a:prstGeom>
+          <a:noFill/>
+        </p:spPr>
+        <p:txBody>
+          <a:bodyPr wrap="none" rtlCol="0">
+            <a:spAutoFit/>
+          </a:bodyPr>
+          <a:lstStyle/>
+          <a:p>
+            <a:r>
+              <a:rPr lang="en-US" dirty="0" smtClean="0"/>
+              <a:t>http://azure.microsoft.com/en-us/documentation/articles/documentdb-sql-query/</a:t>
+            </a:r>
+            <a:endParaRPr lang="en-US" dirty="0"/>
+          </a:p>
+        </p:txBody>
+      </p:sp>
+    </p:spTree>
+    <p:extLst>
+      <p:ext uri="{BB962C8B-B14F-4D97-AF65-F5344CB8AC3E}">
+        <p14:creationId xmlns:p14="http://schemas.microsoft.com/office/powerpoint/2010/main" val="1062708154"/>
+      </p:ext>
+    </p:extLst>
+  </p:cSld>
+  <p:clrMapOvr>
+    <a:masterClrMapping/>
+  </p:clrMapOvr>
+</p:sld>
+</file>
+
+<file path=ppt/slides/slide11.xml><?xml version="1.0" encoding="utf-8"?>
+<p:sld xmlns:a="http://schemas.openxmlformats.org/drawingml/2006/main" xmlns:r="http://schemas.openxmlformats.org/officeDocument/2006/relationships" xmlns:p="http://schemas.openxmlformats.org/presentationml/2006/main">
+  <p:cSld>
+    <p:spTree>
+      <p:nvGrpSpPr>
+        <p:cNvPr id="1" name=""/>
+        <p:cNvGrpSpPr/>
+        <p:nvPr/>
+      </p:nvGrpSpPr>
+      <p:grpSpPr>
+        <a:xfrm>
+          <a:off x="0" y="0"/>
+          <a:ext cx="0" cy="0"/>
+          <a:chOff x="0" y="0"/>
+          <a:chExt cx="0" cy="0"/>
+        </a:xfrm>
+      </p:grpSpPr>
+      <p:sp>
+        <p:nvSpPr>
+          <p:cNvPr id="2" name="Title 1"/>
+          <p:cNvSpPr>
+            <a:spLocks noGrp="1"/>
+          </p:cNvSpPr>
+          <p:nvPr>
+            <p:ph type="title"/>
+          </p:nvPr>
+        </p:nvSpPr>
+        <p:spPr/>
+        <p:txBody>
+          <a:bodyPr/>
+          <a:lstStyle/>
+          <a:p>
+            <a:r>
+              <a:rPr lang="en-US" dirty="0" smtClean="0"/>
+              <a:t>REST API</a:t>
+            </a:r>
+            <a:endParaRPr lang="en-US" dirty="0"/>
+          </a:p>
+        </p:txBody>
+      </p:sp>
+      <p:pic>
+        <p:nvPicPr>
+          <p:cNvPr id="5" name="Picture 4"/>
+          <p:cNvPicPr>
+            <a:picLocks noChangeAspect="1"/>
+          </p:cNvPicPr>
+          <p:nvPr/>
+        </p:nvPicPr>
+        <p:blipFill>
+          <a:blip r:embed="rId2"/>
+          <a:stretch>
+            <a:fillRect/>
+          </a:stretch>
+        </p:blipFill>
+        <p:spPr>
+          <a:xfrm>
+            <a:off x="6334218" y="1581884"/>
+            <a:ext cx="5496018" cy="3893013"/>
+          </a:xfrm>
+          <a:prstGeom prst="rect">
+            <a:avLst/>
+          </a:prstGeom>
+        </p:spPr>
+      </p:pic>
+      <p:pic>
+        <p:nvPicPr>
+          <p:cNvPr id="6" name="Picture 5"/>
+          <p:cNvPicPr>
+            <a:picLocks noChangeAspect="1"/>
+          </p:cNvPicPr>
+          <p:nvPr/>
+        </p:nvPicPr>
+        <p:blipFill>
+          <a:blip r:embed="rId3"/>
+          <a:stretch>
+            <a:fillRect/>
+          </a:stretch>
+        </p:blipFill>
+        <p:spPr>
+          <a:xfrm>
+            <a:off x="475582" y="1581884"/>
+            <a:ext cx="5496018" cy="3893013"/>
+          </a:xfrm>
+          <a:prstGeom prst="rect">
+            <a:avLst/>
+          </a:prstGeom>
+        </p:spPr>
+      </p:pic>
+      <p:sp>
+        <p:nvSpPr>
+          <p:cNvPr id="7" name="TextBox 6"/>
+          <p:cNvSpPr txBox="1"/>
+          <p:nvPr/>
+        </p:nvSpPr>
+        <p:spPr>
+          <a:xfrm>
+            <a:off x="2205780" y="5715000"/>
+            <a:ext cx="2035622" cy="369332"/>
+          </a:xfrm>
+          <a:prstGeom prst="rect">
+            <a:avLst/>
+          </a:prstGeom>
+          <a:noFill/>
+        </p:spPr>
+        <p:txBody>
+          <a:bodyPr wrap="none" rtlCol="0">
+            <a:spAutoFit/>
+          </a:bodyPr>
+          <a:lstStyle/>
+          <a:p>
+            <a:r>
+              <a:rPr lang="en-US" dirty="0" smtClean="0"/>
+              <a:t>Create data request</a:t>
+            </a:r>
+            <a:endParaRPr lang="en-US" dirty="0"/>
+          </a:p>
+        </p:txBody>
+      </p:sp>
+      <p:sp>
+        <p:nvSpPr>
+          <p:cNvPr id="8" name="TextBox 7"/>
+          <p:cNvSpPr txBox="1"/>
+          <p:nvPr/>
+        </p:nvSpPr>
+        <p:spPr>
+          <a:xfrm>
+            <a:off x="8082466" y="5715000"/>
+            <a:ext cx="1999522" cy="369332"/>
+          </a:xfrm>
+          <a:prstGeom prst="rect">
+            <a:avLst/>
+          </a:prstGeom>
+          <a:noFill/>
+        </p:spPr>
+        <p:txBody>
+          <a:bodyPr wrap="none" rtlCol="0">
+            <a:spAutoFit/>
+          </a:bodyPr>
+          <a:lstStyle/>
+          <a:p>
+            <a:r>
+              <a:rPr lang="en-US" dirty="0" smtClean="0"/>
+              <a:t>Query data request</a:t>
+            </a:r>
+          </a:p>
+        </p:txBody>
+      </p:sp>
+      <p:sp>
+        <p:nvSpPr>
+          <p:cNvPr id="9" name="Rectangle 8"/>
+          <p:cNvSpPr/>
+          <p:nvPr/>
+        </p:nvSpPr>
+        <p:spPr>
+          <a:xfrm>
+            <a:off x="7742583" y="3448613"/>
+            <a:ext cx="2872409" cy="288236"/>
+          </a:xfrm>
+          <a:prstGeom prst="rect">
+            <a:avLst/>
+          </a:prstGeom>
+          <a:noFill/>
+          <a:ln w="28575">
+            <a:solidFill>
+              <a:srgbClr val="C00000"/>
+            </a:solidFill>
+          </a:ln>
+        </p:spPr>
+        <p:style>
+          <a:lnRef idx="2">
+            <a:schemeClr val="accent1">
+              <a:shade val="50000"/>
+            </a:schemeClr>
+          </a:lnRef>
+          <a:fillRef idx="1">
+            <a:schemeClr val="accent1"/>
+          </a:fillRef>
+          <a:effectRef idx="0">
+            <a:schemeClr val="accent1"/>
+          </a:effectRef>
+          <a:fontRef idx="minor">
+            <a:schemeClr val="lt1"/>
+          </a:fontRef>
+        </p:style>
+        <p:txBody>
+          <a:bodyPr rtlCol="0" anchor="ctr"/>
+          <a:lstStyle/>
+          <a:p>
+            <a:pPr algn="ctr"/>
+            <a:endParaRPr lang="en-US"/>
+          </a:p>
+        </p:txBody>
+      </p:sp>
+    </p:spTree>
+    <p:extLst>
+      <p:ext uri="{BB962C8B-B14F-4D97-AF65-F5344CB8AC3E}">
+        <p14:creationId xmlns:p14="http://schemas.microsoft.com/office/powerpoint/2010/main" val="556238574"/>
+      </p:ext>
+    </p:extLst>
+  </p:cSld>
+  <p:clrMapOvr>
+    <a:masterClrMapping/>
+  </p:clrMapOvr>
+</p:sld>
+</file>
+
+<file path=ppt/slides/slide12.xml><?xml version="1.0" encoding="utf-8"?>
 <p:sld xmlns:a="http://schemas.openxmlformats.org/drawingml/2006/main" xmlns:r="http://schemas.openxmlformats.org/officeDocument/2006/relationships" xmlns:p="http://schemas.openxmlformats.org/presentationml/2006/main">
   <p:cSld>
     <p:spTree>
@@ -6491,7 +6875,7 @@
       </p:sp>
       <p:pic>
         <p:nvPicPr>
-          <p:cNvPr id="4" name="Picture 3"/>
+          <p:cNvPr id="5" name="Picture 4"/>
           <p:cNvPicPr>
             <a:picLocks noChangeAspect="1"/>
           </p:cNvPicPr>
@@ -6505,8 +6889,8 @@
         </p:blipFill>
         <p:spPr>
           <a:xfrm>
-            <a:off x="770725" y="1374500"/>
-            <a:ext cx="10710184" cy="5480603"/>
+            <a:off x="1476375" y="2219325"/>
+            <a:ext cx="9239250" cy="2419350"/>
           </a:xfrm>
           <a:prstGeom prst="rect">
             <a:avLst/>

</xml_diff>